<commit_message>
Arquivos de janeiro e fevereiro
</commit_message>
<xml_diff>
--- a/ALVF_Organizacional_ConselhoDe Administracao_Fev_2025/Estrutura_OrganizacionalGovernançaDeTI_ALVF.pptx
+++ b/ALVF_Organizacional_ConselhoDe Administracao_Fev_2025/Estrutura_OrganizacionalGovernançaDeTI_ALVF.pptx
@@ -13231,7 +13231,7 @@
           <a:p>
             <a:fld id="{5802BE67-18CC-48B6-B0AC-DBB302AA60FE}" type="datetimeFigureOut">
               <a:rPr lang="pt-BR" smtClean="0"/>
-              <a:t>27/02/2025</a:t>
+              <a:t>03/03/2025</a:t>
             </a:fld>
             <a:endParaRPr lang="pt-BR"/>
           </a:p>
@@ -13838,7 +13838,7 @@
           <a:p>
             <a:fld id="{BFE4FFAD-3A62-4250-AA71-0591979CF141}" type="datetime1">
               <a:rPr lang="en-US" smtClean="0"/>
-              <a:t>2/27/2025</a:t>
+              <a:t>3/3/2025</a:t>
             </a:fld>
             <a:endParaRPr lang="en-US"/>
           </a:p>
@@ -14040,7 +14040,7 @@
           <a:p>
             <a:fld id="{CE114BD6-48AA-47C0-B94F-C46F60402176}" type="datetime1">
               <a:rPr lang="en-US" smtClean="0"/>
-              <a:t>2/27/2025</a:t>
+              <a:t>3/3/2025</a:t>
             </a:fld>
             <a:endParaRPr lang="en-US"/>
           </a:p>
@@ -14252,7 +14252,7 @@
           <a:p>
             <a:fld id="{9ABF8ADF-9B76-44A6-B6EA-471E6DF6E6AA}" type="datetime1">
               <a:rPr lang="en-US" smtClean="0"/>
-              <a:t>2/27/2025</a:t>
+              <a:t>3/3/2025</a:t>
             </a:fld>
             <a:endParaRPr lang="en-US"/>
           </a:p>
@@ -14684,7 +14684,7 @@
           <a:p>
             <a:fld id="{14D8F9AD-777A-4F53-8858-9DA26F058C41}" type="datetime1">
               <a:rPr lang="en-US" smtClean="0"/>
-              <a:t>2/27/2025</a:t>
+              <a:t>3/3/2025</a:t>
             </a:fld>
             <a:endParaRPr lang="en-US"/>
           </a:p>
@@ -14963,7 +14963,7 @@
           <a:p>
             <a:fld id="{1AF50731-E86D-4B1F-9538-1FDE68E9C0A1}" type="datetime1">
               <a:rPr lang="en-US" smtClean="0"/>
-              <a:t>2/27/2025</a:t>
+              <a:t>3/3/2025</a:t>
             </a:fld>
             <a:endParaRPr lang="en-US"/>
           </a:p>
@@ -15232,7 +15232,7 @@
           <a:p>
             <a:fld id="{4870C0A8-D657-4728-9509-CE655A44CD6F}" type="datetime1">
               <a:rPr lang="en-US" smtClean="0"/>
-              <a:t>2/27/2025</a:t>
+              <a:t>3/3/2025</a:t>
             </a:fld>
             <a:endParaRPr lang="en-US"/>
           </a:p>
@@ -15648,7 +15648,7 @@
           <a:p>
             <a:fld id="{7B0AA548-16D3-4073-BFED-C6E521FC23D1}" type="datetime1">
               <a:rPr lang="en-US" smtClean="0"/>
-              <a:t>2/27/2025</a:t>
+              <a:t>3/3/2025</a:t>
             </a:fld>
             <a:endParaRPr lang="en-US"/>
           </a:p>
@@ -15793,7 +15793,7 @@
           <a:p>
             <a:fld id="{D9959E26-F3B9-47B7-802A-397C70086748}" type="datetime1">
               <a:rPr lang="en-US" smtClean="0"/>
-              <a:t>2/27/2025</a:t>
+              <a:t>3/3/2025</a:t>
             </a:fld>
             <a:endParaRPr lang="en-US"/>
           </a:p>
@@ -15910,7 +15910,7 @@
           <a:p>
             <a:fld id="{EFE58726-5B6F-41BC-B236-2EF163BF8F9F}" type="datetime1">
               <a:rPr lang="en-US" smtClean="0"/>
-              <a:t>2/27/2025</a:t>
+              <a:t>3/3/2025</a:t>
             </a:fld>
             <a:endParaRPr lang="en-US"/>
           </a:p>
@@ -16225,7 +16225,7 @@
           <a:p>
             <a:fld id="{464A4F33-A884-4C38-B7DD-299F7B472609}" type="datetime1">
               <a:rPr lang="en-US" smtClean="0"/>
-              <a:t>2/27/2025</a:t>
+              <a:t>3/3/2025</a:t>
             </a:fld>
             <a:endParaRPr lang="en-US"/>
           </a:p>
@@ -16517,7 +16517,7 @@
           <a:p>
             <a:fld id="{E7F0B07D-52C0-4795-9A81-904239F81F30}" type="datetime1">
               <a:rPr lang="en-US" smtClean="0"/>
-              <a:t>2/27/2025</a:t>
+              <a:t>3/3/2025</a:t>
             </a:fld>
             <a:endParaRPr lang="en-US"/>
           </a:p>
@@ -16762,7 +16762,7 @@
           <a:p>
             <a:fld id="{BDD0FBF9-9FB5-46CF-A552-54744C1FA793}" type="datetime1">
               <a:rPr lang="en-US" smtClean="0"/>
-              <a:t>2/27/2025</a:t>
+              <a:t>3/3/2025</a:t>
             </a:fld>
             <a:endParaRPr lang="en-US"/>
           </a:p>

</xml_diff>

<commit_message>
Atualização profissionais de TI - Organograma
</commit_message>
<xml_diff>
--- a/ALVF_Organizacional_ConselhoDe Administracao_Fev_2025/Estrutura_OrganizacionalGovernançaDeTI_ALVF.pptx
+++ b/ALVF_Organizacional_ConselhoDe Administracao_Fev_2025/Estrutura_OrganizacionalGovernançaDeTI_ALVF.pptx
@@ -5,7 +5,7 @@
     <p:sldMasterId id="2147483744" r:id="rId1"/>
   </p:sldMasterIdLst>
   <p:notesMasterIdLst>
-    <p:notesMasterId r:id="rId22"/>
+    <p:notesMasterId r:id="rId23"/>
   </p:notesMasterIdLst>
   <p:sldIdLst>
     <p:sldId id="256" r:id="rId2"/>
@@ -26,8 +26,9 @@
     <p:sldId id="369" r:id="rId17"/>
     <p:sldId id="370" r:id="rId18"/>
     <p:sldId id="375" r:id="rId19"/>
-    <p:sldId id="374" r:id="rId20"/>
-    <p:sldId id="429" r:id="rId21"/>
+    <p:sldId id="431" r:id="rId20"/>
+    <p:sldId id="374" r:id="rId21"/>
+    <p:sldId id="429" r:id="rId22"/>
   </p:sldIdLst>
   <p:sldSz cx="9144000" cy="6858000" type="screen4x3"/>
   <p:notesSz cx="6858000" cy="9144000"/>
@@ -13335,7 +13336,7 @@
           <a:p>
             <a:fld id="{5802BE67-18CC-48B6-B0AC-DBB302AA60FE}" type="datetimeFigureOut">
               <a:rPr lang="pt-BR" smtClean="0"/>
-              <a:t>05/03/2025</a:t>
+              <a:t>28/03/2025</a:t>
             </a:fld>
             <a:endParaRPr lang="pt-BR"/>
           </a:p>
@@ -13942,7 +13943,7 @@
           <a:p>
             <a:fld id="{BFE4FFAD-3A62-4250-AA71-0591979CF141}" type="datetime1">
               <a:rPr lang="en-US" smtClean="0"/>
-              <a:t>3/5/2025</a:t>
+              <a:t>3/28/2025</a:t>
             </a:fld>
             <a:endParaRPr lang="en-US"/>
           </a:p>
@@ -14144,7 +14145,7 @@
           <a:p>
             <a:fld id="{CE114BD6-48AA-47C0-B94F-C46F60402176}" type="datetime1">
               <a:rPr lang="en-US" smtClean="0"/>
-              <a:t>3/5/2025</a:t>
+              <a:t>3/28/2025</a:t>
             </a:fld>
             <a:endParaRPr lang="en-US"/>
           </a:p>
@@ -14356,7 +14357,7 @@
           <a:p>
             <a:fld id="{9ABF8ADF-9B76-44A6-B6EA-471E6DF6E6AA}" type="datetime1">
               <a:rPr lang="en-US" smtClean="0"/>
-              <a:t>3/5/2025</a:t>
+              <a:t>3/28/2025</a:t>
             </a:fld>
             <a:endParaRPr lang="en-US"/>
           </a:p>
@@ -14788,7 +14789,7 @@
           <a:p>
             <a:fld id="{14D8F9AD-777A-4F53-8858-9DA26F058C41}" type="datetime1">
               <a:rPr lang="en-US" smtClean="0"/>
-              <a:t>3/5/2025</a:t>
+              <a:t>3/28/2025</a:t>
             </a:fld>
             <a:endParaRPr lang="en-US"/>
           </a:p>
@@ -15067,7 +15068,7 @@
           <a:p>
             <a:fld id="{1AF50731-E86D-4B1F-9538-1FDE68E9C0A1}" type="datetime1">
               <a:rPr lang="en-US" smtClean="0"/>
-              <a:t>3/5/2025</a:t>
+              <a:t>3/28/2025</a:t>
             </a:fld>
             <a:endParaRPr lang="en-US"/>
           </a:p>
@@ -15336,7 +15337,7 @@
           <a:p>
             <a:fld id="{4870C0A8-D657-4728-9509-CE655A44CD6F}" type="datetime1">
               <a:rPr lang="en-US" smtClean="0"/>
-              <a:t>3/5/2025</a:t>
+              <a:t>3/28/2025</a:t>
             </a:fld>
             <a:endParaRPr lang="en-US"/>
           </a:p>
@@ -15752,7 +15753,7 @@
           <a:p>
             <a:fld id="{7B0AA548-16D3-4073-BFED-C6E521FC23D1}" type="datetime1">
               <a:rPr lang="en-US" smtClean="0"/>
-              <a:t>3/5/2025</a:t>
+              <a:t>3/28/2025</a:t>
             </a:fld>
             <a:endParaRPr lang="en-US"/>
           </a:p>
@@ -15897,7 +15898,7 @@
           <a:p>
             <a:fld id="{D9959E26-F3B9-47B7-802A-397C70086748}" type="datetime1">
               <a:rPr lang="en-US" smtClean="0"/>
-              <a:t>3/5/2025</a:t>
+              <a:t>3/28/2025</a:t>
             </a:fld>
             <a:endParaRPr lang="en-US"/>
           </a:p>
@@ -16014,7 +16015,7 @@
           <a:p>
             <a:fld id="{EFE58726-5B6F-41BC-B236-2EF163BF8F9F}" type="datetime1">
               <a:rPr lang="en-US" smtClean="0"/>
-              <a:t>3/5/2025</a:t>
+              <a:t>3/28/2025</a:t>
             </a:fld>
             <a:endParaRPr lang="en-US"/>
           </a:p>
@@ -16329,7 +16330,7 @@
           <a:p>
             <a:fld id="{464A4F33-A884-4C38-B7DD-299F7B472609}" type="datetime1">
               <a:rPr lang="en-US" smtClean="0"/>
-              <a:t>3/5/2025</a:t>
+              <a:t>3/28/2025</a:t>
             </a:fld>
             <a:endParaRPr lang="en-US"/>
           </a:p>
@@ -16621,7 +16622,7 @@
           <a:p>
             <a:fld id="{E7F0B07D-52C0-4795-9A81-904239F81F30}" type="datetime1">
               <a:rPr lang="en-US" smtClean="0"/>
-              <a:t>3/5/2025</a:t>
+              <a:t>3/28/2025</a:t>
             </a:fld>
             <a:endParaRPr lang="en-US"/>
           </a:p>
@@ -16866,7 +16867,7 @@
           <a:p>
             <a:fld id="{BDD0FBF9-9FB5-46CF-A552-54744C1FA793}" type="datetime1">
               <a:rPr lang="en-US" smtClean="0"/>
-              <a:t>3/5/2025</a:t>
+              <a:t>3/28/2025</a:t>
             </a:fld>
             <a:endParaRPr lang="en-US"/>
           </a:p>
@@ -22763,6 +22764,1438 @@
           <p:cNvPr id="2" name="Título 1">
             <a:extLst>
               <a:ext uri="{FF2B5EF4-FFF2-40B4-BE49-F238E27FC236}">
+                <a16:creationId xmlns:a16="http://schemas.microsoft.com/office/drawing/2014/main" id="{0C3FE56C-72D6-5CD9-DB8E-3B269353062B}"/>
+              </a:ext>
+            </a:extLst>
+          </p:cNvPr>
+          <p:cNvSpPr>
+            <a:spLocks noGrp="1"/>
+          </p:cNvSpPr>
+          <p:nvPr>
+            <p:ph type="title"/>
+          </p:nvPr>
+        </p:nvSpPr>
+        <p:spPr>
+          <a:xfrm>
+            <a:off x="243068" y="207200"/>
+            <a:ext cx="8657864" cy="1325563"/>
+          </a:xfrm>
+        </p:spPr>
+        <p:txBody>
+          <a:bodyPr>
+            <a:normAutofit fontScale="90000"/>
+          </a:bodyPr>
+          <a:lstStyle/>
+          <a:p>
+            <a:pPr algn="ctr"/>
+            <a:r>
+              <a:rPr lang="pt-BR" sz="6000" b="1" i="0" dirty="0">
+                <a:solidFill>
+                  <a:srgbClr val="002060"/>
+                </a:solidFill>
+                <a:effectLst/>
+                <a:latin typeface="Glassdoor Sans"/>
+              </a:rPr>
+              <a:t>Gestor de TI e o Perfil</a:t>
+            </a:r>
+            <a:br>
+              <a:rPr lang="pt-BR" sz="6000" b="1" i="0" dirty="0">
+                <a:solidFill>
+                  <a:srgbClr val="002060"/>
+                </a:solidFill>
+                <a:effectLst/>
+                <a:latin typeface="Glassdoor Sans"/>
+              </a:rPr>
+            </a:br>
+            <a:r>
+              <a:rPr lang="pt-BR" sz="6000" b="1" i="0" dirty="0">
+                <a:solidFill>
+                  <a:srgbClr val="002060"/>
+                </a:solidFill>
+                <a:effectLst/>
+                <a:latin typeface="Glassdoor Sans"/>
+              </a:rPr>
+              <a:t>Desenvolvedor</a:t>
+            </a:r>
+            <a:endParaRPr lang="pt-BR" sz="5400" dirty="0">
+              <a:solidFill>
+                <a:srgbClr val="002060"/>
+              </a:solidFill>
+            </a:endParaRPr>
+          </a:p>
+        </p:txBody>
+      </p:sp>
+      <p:pic>
+        <p:nvPicPr>
+          <p:cNvPr id="5" name="Imagem 4">
+            <a:extLst>
+              <a:ext uri="{FF2B5EF4-FFF2-40B4-BE49-F238E27FC236}">
+                <a16:creationId xmlns:a16="http://schemas.microsoft.com/office/drawing/2014/main" id="{2E1380AE-F0C5-9B61-D3E1-8FC1E28DC4B7}"/>
+              </a:ext>
+            </a:extLst>
+          </p:cNvPr>
+          <p:cNvPicPr>
+            <a:picLocks noChangeAspect="1"/>
+          </p:cNvPicPr>
+          <p:nvPr/>
+        </p:nvPicPr>
+        <p:blipFill>
+          <a:blip r:embed="rId2"/>
+          <a:stretch>
+            <a:fillRect/>
+          </a:stretch>
+        </p:blipFill>
+        <p:spPr>
+          <a:xfrm>
+            <a:off x="1422138" y="1803576"/>
+            <a:ext cx="5471634" cy="2263336"/>
+          </a:xfrm>
+          <a:prstGeom prst="rect">
+            <a:avLst/>
+          </a:prstGeom>
+        </p:spPr>
+      </p:pic>
+      <p:sp>
+        <p:nvSpPr>
+          <p:cNvPr id="6" name="Retângulo: Cantos Arredondados 5">
+            <a:extLst>
+              <a:ext uri="{FF2B5EF4-FFF2-40B4-BE49-F238E27FC236}">
+                <a16:creationId xmlns:a16="http://schemas.microsoft.com/office/drawing/2014/main" id="{516C03FA-E815-47D5-B695-2A45F1067A8D}"/>
+              </a:ext>
+            </a:extLst>
+          </p:cNvPr>
+          <p:cNvSpPr/>
+          <p:nvPr/>
+        </p:nvSpPr>
+        <p:spPr>
+          <a:xfrm>
+            <a:off x="1106977" y="3544862"/>
+            <a:ext cx="7056940" cy="787078"/>
+          </a:xfrm>
+          <a:prstGeom prst="roundRect">
+            <a:avLst/>
+          </a:prstGeom>
+          <a:noFill/>
+        </p:spPr>
+        <p:style>
+          <a:lnRef idx="2">
+            <a:schemeClr val="accent1">
+              <a:shade val="15000"/>
+            </a:schemeClr>
+          </a:lnRef>
+          <a:fillRef idx="1">
+            <a:schemeClr val="accent1"/>
+          </a:fillRef>
+          <a:effectRef idx="0">
+            <a:schemeClr val="accent1"/>
+          </a:effectRef>
+          <a:fontRef idx="minor">
+            <a:schemeClr val="lt1"/>
+          </a:fontRef>
+        </p:style>
+        <p:txBody>
+          <a:bodyPr rtlCol="0" anchor="ctr"/>
+          <a:lstStyle/>
+          <a:p>
+            <a:pPr algn="ctr"/>
+            <a:endParaRPr lang="pt-BR"/>
+          </a:p>
+        </p:txBody>
+      </p:sp>
+      <p:sp>
+        <p:nvSpPr>
+          <p:cNvPr id="7" name="CaixaDeTexto 6">
+            <a:extLst>
+              <a:ext uri="{FF2B5EF4-FFF2-40B4-BE49-F238E27FC236}">
+                <a16:creationId xmlns:a16="http://schemas.microsoft.com/office/drawing/2014/main" id="{0519420C-392C-1925-B32C-B301A0FAEF99}"/>
+              </a:ext>
+            </a:extLst>
+          </p:cNvPr>
+          <p:cNvSpPr txBox="1"/>
+          <p:nvPr/>
+        </p:nvSpPr>
+        <p:spPr>
+          <a:xfrm>
+            <a:off x="6449742" y="3650077"/>
+            <a:ext cx="1768830" cy="584775"/>
+          </a:xfrm>
+          <a:prstGeom prst="rect">
+            <a:avLst/>
+          </a:prstGeom>
+          <a:noFill/>
+        </p:spPr>
+        <p:txBody>
+          <a:bodyPr wrap="square" rtlCol="0">
+            <a:spAutoFit/>
+          </a:bodyPr>
+          <a:lstStyle/>
+          <a:p>
+            <a:pPr algn="ctr"/>
+            <a:r>
+              <a:rPr lang="pt-BR" sz="1600" b="1" dirty="0">
+                <a:solidFill>
+                  <a:schemeClr val="accent6">
+                    <a:lumMod val="60000"/>
+                    <a:lumOff val="40000"/>
+                  </a:schemeClr>
+                </a:solidFill>
+              </a:rPr>
+              <a:t>Universidades Mercado</a:t>
+            </a:r>
+          </a:p>
+        </p:txBody>
+      </p:sp>
+      <p:sp>
+        <p:nvSpPr>
+          <p:cNvPr id="8" name="Retângulo: Cantos Arredondados 7">
+            <a:extLst>
+              <a:ext uri="{FF2B5EF4-FFF2-40B4-BE49-F238E27FC236}">
+                <a16:creationId xmlns:a16="http://schemas.microsoft.com/office/drawing/2014/main" id="{57014C3B-A540-3FD5-8673-54DD26E19972}"/>
+              </a:ext>
+            </a:extLst>
+          </p:cNvPr>
+          <p:cNvSpPr/>
+          <p:nvPr/>
+        </p:nvSpPr>
+        <p:spPr>
+          <a:xfrm>
+            <a:off x="1106977" y="2700953"/>
+            <a:ext cx="7056940" cy="787078"/>
+          </a:xfrm>
+          <a:prstGeom prst="roundRect">
+            <a:avLst/>
+          </a:prstGeom>
+          <a:noFill/>
+        </p:spPr>
+        <p:style>
+          <a:lnRef idx="2">
+            <a:schemeClr val="accent1">
+              <a:shade val="15000"/>
+            </a:schemeClr>
+          </a:lnRef>
+          <a:fillRef idx="1">
+            <a:schemeClr val="accent1"/>
+          </a:fillRef>
+          <a:effectRef idx="0">
+            <a:schemeClr val="accent1"/>
+          </a:effectRef>
+          <a:fontRef idx="minor">
+            <a:schemeClr val="lt1"/>
+          </a:fontRef>
+        </p:style>
+        <p:txBody>
+          <a:bodyPr rtlCol="0" anchor="ctr"/>
+          <a:lstStyle/>
+          <a:p>
+            <a:pPr algn="ctr"/>
+            <a:endParaRPr lang="pt-BR"/>
+          </a:p>
+        </p:txBody>
+      </p:sp>
+      <p:sp>
+        <p:nvSpPr>
+          <p:cNvPr id="9" name="CaixaDeTexto 8">
+            <a:extLst>
+              <a:ext uri="{FF2B5EF4-FFF2-40B4-BE49-F238E27FC236}">
+                <a16:creationId xmlns:a16="http://schemas.microsoft.com/office/drawing/2014/main" id="{58EB6C63-DDEE-55CD-D7CD-2532C5E1E620}"/>
+              </a:ext>
+            </a:extLst>
+          </p:cNvPr>
+          <p:cNvSpPr txBox="1"/>
+          <p:nvPr/>
+        </p:nvSpPr>
+        <p:spPr>
+          <a:xfrm>
+            <a:off x="6542339" y="2771326"/>
+            <a:ext cx="1768830" cy="584775"/>
+          </a:xfrm>
+          <a:prstGeom prst="rect">
+            <a:avLst/>
+          </a:prstGeom>
+          <a:noFill/>
+        </p:spPr>
+        <p:txBody>
+          <a:bodyPr wrap="square" rtlCol="0">
+            <a:spAutoFit/>
+          </a:bodyPr>
+          <a:lstStyle/>
+          <a:p>
+            <a:pPr algn="ctr"/>
+            <a:r>
+              <a:rPr lang="pt-BR" sz="1600" b="1" dirty="0">
+                <a:solidFill>
+                  <a:schemeClr val="accent6">
+                    <a:lumMod val="60000"/>
+                    <a:lumOff val="40000"/>
+                  </a:schemeClr>
+                </a:solidFill>
+              </a:rPr>
+              <a:t>Existentes no Mercado</a:t>
+            </a:r>
+          </a:p>
+        </p:txBody>
+      </p:sp>
+      <p:sp>
+        <p:nvSpPr>
+          <p:cNvPr id="10" name="Retângulo: Cantos Arredondados 9">
+            <a:extLst>
+              <a:ext uri="{FF2B5EF4-FFF2-40B4-BE49-F238E27FC236}">
+                <a16:creationId xmlns:a16="http://schemas.microsoft.com/office/drawing/2014/main" id="{418A523F-8C79-9F26-E847-880D4288018F}"/>
+              </a:ext>
+            </a:extLst>
+          </p:cNvPr>
+          <p:cNvSpPr/>
+          <p:nvPr/>
+        </p:nvSpPr>
+        <p:spPr>
+          <a:xfrm>
+            <a:off x="1106977" y="2317945"/>
+            <a:ext cx="7056940" cy="347822"/>
+          </a:xfrm>
+          <a:prstGeom prst="roundRect">
+            <a:avLst/>
+          </a:prstGeom>
+          <a:noFill/>
+        </p:spPr>
+        <p:style>
+          <a:lnRef idx="2">
+            <a:schemeClr val="accent1">
+              <a:shade val="15000"/>
+            </a:schemeClr>
+          </a:lnRef>
+          <a:fillRef idx="1">
+            <a:schemeClr val="accent1"/>
+          </a:fillRef>
+          <a:effectRef idx="0">
+            <a:schemeClr val="accent1"/>
+          </a:effectRef>
+          <a:fontRef idx="minor">
+            <a:schemeClr val="lt1"/>
+          </a:fontRef>
+        </p:style>
+        <p:txBody>
+          <a:bodyPr rtlCol="0" anchor="ctr"/>
+          <a:lstStyle/>
+          <a:p>
+            <a:pPr algn="ctr"/>
+            <a:endParaRPr lang="pt-BR"/>
+          </a:p>
+        </p:txBody>
+      </p:sp>
+      <p:sp>
+        <p:nvSpPr>
+          <p:cNvPr id="11" name="CaixaDeTexto 10">
+            <a:extLst>
+              <a:ext uri="{FF2B5EF4-FFF2-40B4-BE49-F238E27FC236}">
+                <a16:creationId xmlns:a16="http://schemas.microsoft.com/office/drawing/2014/main" id="{1E266605-AD40-0FD9-29D3-C7BB82156137}"/>
+              </a:ext>
+            </a:extLst>
+          </p:cNvPr>
+          <p:cNvSpPr txBox="1"/>
+          <p:nvPr/>
+        </p:nvSpPr>
+        <p:spPr>
+          <a:xfrm>
+            <a:off x="4919242" y="2314028"/>
+            <a:ext cx="3391928" cy="338554"/>
+          </a:xfrm>
+          <a:prstGeom prst="rect">
+            <a:avLst/>
+          </a:prstGeom>
+          <a:noFill/>
+        </p:spPr>
+        <p:txBody>
+          <a:bodyPr wrap="square" rtlCol="0">
+            <a:spAutoFit/>
+          </a:bodyPr>
+          <a:lstStyle/>
+          <a:p>
+            <a:pPr algn="ctr"/>
+            <a:r>
+              <a:rPr lang="pt-BR" sz="1600" b="1" dirty="0">
+                <a:solidFill>
+                  <a:schemeClr val="accent6">
+                    <a:lumMod val="60000"/>
+                    <a:lumOff val="40000"/>
+                  </a:schemeClr>
+                </a:solidFill>
+              </a:rPr>
+              <a:t>Expertise atualizada em TI Saúde</a:t>
+            </a:r>
+          </a:p>
+        </p:txBody>
+      </p:sp>
+      <p:sp>
+        <p:nvSpPr>
+          <p:cNvPr id="12" name="Retângulo: Cantos Arredondados 11">
+            <a:extLst>
+              <a:ext uri="{FF2B5EF4-FFF2-40B4-BE49-F238E27FC236}">
+                <a16:creationId xmlns:a16="http://schemas.microsoft.com/office/drawing/2014/main" id="{C03868FC-F80E-4481-23F5-94518A815818}"/>
+              </a:ext>
+            </a:extLst>
+          </p:cNvPr>
+          <p:cNvSpPr/>
+          <p:nvPr/>
+        </p:nvSpPr>
+        <p:spPr>
+          <a:xfrm>
+            <a:off x="655564" y="2683360"/>
+            <a:ext cx="7998107" cy="2192590"/>
+          </a:xfrm>
+          <a:prstGeom prst="roundRect">
+            <a:avLst/>
+          </a:prstGeom>
+          <a:noFill/>
+        </p:spPr>
+        <p:style>
+          <a:lnRef idx="2">
+            <a:schemeClr val="accent1">
+              <a:shade val="15000"/>
+            </a:schemeClr>
+          </a:lnRef>
+          <a:fillRef idx="1">
+            <a:schemeClr val="accent1"/>
+          </a:fillRef>
+          <a:effectRef idx="0">
+            <a:schemeClr val="accent1"/>
+          </a:effectRef>
+          <a:fontRef idx="minor">
+            <a:schemeClr val="lt1"/>
+          </a:fontRef>
+        </p:style>
+        <p:txBody>
+          <a:bodyPr rtlCol="0" anchor="ctr"/>
+          <a:lstStyle/>
+          <a:p>
+            <a:pPr algn="ctr"/>
+            <a:endParaRPr lang="pt-BR"/>
+          </a:p>
+        </p:txBody>
+      </p:sp>
+      <p:sp>
+        <p:nvSpPr>
+          <p:cNvPr id="13" name="CaixaDeTexto 12">
+            <a:extLst>
+              <a:ext uri="{FF2B5EF4-FFF2-40B4-BE49-F238E27FC236}">
+                <a16:creationId xmlns:a16="http://schemas.microsoft.com/office/drawing/2014/main" id="{FEF3A1C2-B8C8-1669-45FA-DF6FB1D486B2}"/>
+              </a:ext>
+            </a:extLst>
+          </p:cNvPr>
+          <p:cNvSpPr txBox="1"/>
+          <p:nvPr/>
+        </p:nvSpPr>
+        <p:spPr>
+          <a:xfrm>
+            <a:off x="490329" y="4457359"/>
+            <a:ext cx="3149862" cy="369332"/>
+          </a:xfrm>
+          <a:prstGeom prst="rect">
+            <a:avLst/>
+          </a:prstGeom>
+          <a:noFill/>
+        </p:spPr>
+        <p:txBody>
+          <a:bodyPr wrap="square" rtlCol="0">
+            <a:spAutoFit/>
+          </a:bodyPr>
+          <a:lstStyle/>
+          <a:p>
+            <a:pPr algn="ctr"/>
+            <a:r>
+              <a:rPr lang="pt-BR" b="1" dirty="0">
+                <a:solidFill>
+                  <a:schemeClr val="accent6">
+                    <a:lumMod val="60000"/>
+                    <a:lumOff val="40000"/>
+                  </a:schemeClr>
+                </a:solidFill>
+              </a:rPr>
+              <a:t>Gestão de Talentos</a:t>
+            </a:r>
+          </a:p>
+        </p:txBody>
+      </p:sp>
+      <p:sp>
+        <p:nvSpPr>
+          <p:cNvPr id="14" name="Espaço Reservado para Rodapé 13">
+            <a:extLst>
+              <a:ext uri="{FF2B5EF4-FFF2-40B4-BE49-F238E27FC236}">
+                <a16:creationId xmlns:a16="http://schemas.microsoft.com/office/drawing/2014/main" id="{6860B7CB-3BBC-CDC3-B69B-8D4FD11AEC13}"/>
+              </a:ext>
+            </a:extLst>
+          </p:cNvPr>
+          <p:cNvSpPr>
+            <a:spLocks noGrp="1"/>
+          </p:cNvSpPr>
+          <p:nvPr>
+            <p:ph type="ftr" sz="quarter" idx="11"/>
+          </p:nvPr>
+        </p:nvSpPr>
+        <p:spPr/>
+        <p:txBody>
+          <a:bodyPr/>
+          <a:lstStyle/>
+          <a:p>
+            <a:r>
+              <a:rPr lang="pt-BR"/>
+              <a:t>ALVF – Associação Hospitalar Lenoir Vargas Ferreira</a:t>
+            </a:r>
+            <a:endParaRPr lang="en-US"/>
+          </a:p>
+        </p:txBody>
+      </p:sp>
+      <p:sp>
+        <p:nvSpPr>
+          <p:cNvPr id="4" name="Seta: para Cima 3">
+            <a:extLst>
+              <a:ext uri="{FF2B5EF4-FFF2-40B4-BE49-F238E27FC236}">
+                <a16:creationId xmlns:a16="http://schemas.microsoft.com/office/drawing/2014/main" id="{A72875B9-F7B2-52DE-B168-2ECCB1339A4E}"/>
+              </a:ext>
+            </a:extLst>
+          </p:cNvPr>
+          <p:cNvSpPr/>
+          <p:nvPr/>
+        </p:nvSpPr>
+        <p:spPr>
+          <a:xfrm rot="5400000">
+            <a:off x="195219" y="4368261"/>
+            <a:ext cx="953317" cy="547527"/>
+          </a:xfrm>
+          <a:prstGeom prst="upArrow">
+            <a:avLst>
+              <a:gd name="adj1" fmla="val 50000"/>
+              <a:gd name="adj2" fmla="val 65670"/>
+            </a:avLst>
+          </a:prstGeom>
+        </p:spPr>
+        <p:style>
+          <a:lnRef idx="2">
+            <a:schemeClr val="accent1">
+              <a:shade val="15000"/>
+            </a:schemeClr>
+          </a:lnRef>
+          <a:fillRef idx="1">
+            <a:schemeClr val="accent1"/>
+          </a:fillRef>
+          <a:effectRef idx="0">
+            <a:schemeClr val="accent1"/>
+          </a:effectRef>
+          <a:fontRef idx="minor">
+            <a:schemeClr val="lt1"/>
+          </a:fontRef>
+        </p:style>
+        <p:txBody>
+          <a:bodyPr rtlCol="0" anchor="ctr"/>
+          <a:lstStyle/>
+          <a:p>
+            <a:pPr algn="ctr"/>
+            <a:endParaRPr lang="pt-BR"/>
+          </a:p>
+        </p:txBody>
+      </p:sp>
+      <p:sp>
+        <p:nvSpPr>
+          <p:cNvPr id="15" name="Seta: para Cima 14">
+            <a:extLst>
+              <a:ext uri="{FF2B5EF4-FFF2-40B4-BE49-F238E27FC236}">
+                <a16:creationId xmlns:a16="http://schemas.microsoft.com/office/drawing/2014/main" id="{1B230B78-8079-7AEE-F194-C89B9C0F72B4}"/>
+              </a:ext>
+            </a:extLst>
+          </p:cNvPr>
+          <p:cNvSpPr/>
+          <p:nvPr/>
+        </p:nvSpPr>
+        <p:spPr>
+          <a:xfrm rot="16037579">
+            <a:off x="7883785" y="3813443"/>
+            <a:ext cx="953317" cy="396000"/>
+          </a:xfrm>
+          <a:prstGeom prst="upArrow">
+            <a:avLst>
+              <a:gd name="adj1" fmla="val 50000"/>
+              <a:gd name="adj2" fmla="val 65670"/>
+            </a:avLst>
+          </a:prstGeom>
+        </p:spPr>
+        <p:style>
+          <a:lnRef idx="2">
+            <a:schemeClr val="accent1">
+              <a:shade val="15000"/>
+            </a:schemeClr>
+          </a:lnRef>
+          <a:fillRef idx="1">
+            <a:schemeClr val="accent1"/>
+          </a:fillRef>
+          <a:effectRef idx="0">
+            <a:schemeClr val="accent1"/>
+          </a:effectRef>
+          <a:fontRef idx="minor">
+            <a:schemeClr val="lt1"/>
+          </a:fontRef>
+        </p:style>
+        <p:txBody>
+          <a:bodyPr rtlCol="0" anchor="ctr"/>
+          <a:lstStyle/>
+          <a:p>
+            <a:pPr algn="ctr"/>
+            <a:endParaRPr lang="pt-BR"/>
+          </a:p>
+        </p:txBody>
+      </p:sp>
+      <p:sp>
+        <p:nvSpPr>
+          <p:cNvPr id="16" name="Seta: para Cima 15">
+            <a:extLst>
+              <a:ext uri="{FF2B5EF4-FFF2-40B4-BE49-F238E27FC236}">
+                <a16:creationId xmlns:a16="http://schemas.microsoft.com/office/drawing/2014/main" id="{3B31580D-A7EF-CE04-1279-744E44942AB8}"/>
+              </a:ext>
+            </a:extLst>
+          </p:cNvPr>
+          <p:cNvSpPr/>
+          <p:nvPr/>
+        </p:nvSpPr>
+        <p:spPr>
+          <a:xfrm rot="10800000">
+            <a:off x="6065680" y="1775236"/>
+            <a:ext cx="953317" cy="547527"/>
+          </a:xfrm>
+          <a:prstGeom prst="upArrow">
+            <a:avLst>
+              <a:gd name="adj1" fmla="val 50000"/>
+              <a:gd name="adj2" fmla="val 65670"/>
+            </a:avLst>
+          </a:prstGeom>
+        </p:spPr>
+        <p:style>
+          <a:lnRef idx="2">
+            <a:schemeClr val="accent1">
+              <a:shade val="15000"/>
+            </a:schemeClr>
+          </a:lnRef>
+          <a:fillRef idx="1">
+            <a:schemeClr val="accent1"/>
+          </a:fillRef>
+          <a:effectRef idx="0">
+            <a:schemeClr val="accent1"/>
+          </a:effectRef>
+          <a:fontRef idx="minor">
+            <a:schemeClr val="lt1"/>
+          </a:fontRef>
+        </p:style>
+        <p:txBody>
+          <a:bodyPr rtlCol="0" anchor="ctr"/>
+          <a:lstStyle/>
+          <a:p>
+            <a:pPr algn="ctr"/>
+            <a:endParaRPr lang="pt-BR"/>
+          </a:p>
+        </p:txBody>
+      </p:sp>
+      <p:cxnSp>
+        <p:nvCxnSpPr>
+          <p:cNvPr id="22" name="Conector: Angulado 21">
+            <a:extLst>
+              <a:ext uri="{FF2B5EF4-FFF2-40B4-BE49-F238E27FC236}">
+                <a16:creationId xmlns:a16="http://schemas.microsoft.com/office/drawing/2014/main" id="{3D2D0036-0461-CD9E-237F-C60F46106B3B}"/>
+              </a:ext>
+            </a:extLst>
+          </p:cNvPr>
+          <p:cNvCxnSpPr>
+            <a:cxnSpLocks/>
+            <a:stCxn id="28" idx="2"/>
+            <a:endCxn id="15" idx="2"/>
+          </p:cNvCxnSpPr>
+          <p:nvPr/>
+        </p:nvCxnSpPr>
+        <p:spPr>
+          <a:xfrm>
+            <a:off x="8548208" y="3021616"/>
+            <a:ext cx="10015" cy="980475"/>
+          </a:xfrm>
+          <a:prstGeom prst="bentConnector3">
+            <a:avLst>
+              <a:gd name="adj1" fmla="val 5167189"/>
+            </a:avLst>
+          </a:prstGeom>
+          <a:ln w="76200" cap="flat" cmpd="sng" algn="ctr">
+            <a:solidFill>
+              <a:schemeClr val="accent1"/>
+            </a:solidFill>
+            <a:prstDash val="dash"/>
+            <a:round/>
+            <a:headEnd type="none" w="med" len="med"/>
+            <a:tailEnd type="none" w="med" len="med"/>
+          </a:ln>
+        </p:spPr>
+        <p:style>
+          <a:lnRef idx="0">
+            <a:scrgbClr r="0" g="0" b="0"/>
+          </a:lnRef>
+          <a:fillRef idx="0">
+            <a:scrgbClr r="0" g="0" b="0"/>
+          </a:fillRef>
+          <a:effectRef idx="0">
+            <a:scrgbClr r="0" g="0" b="0"/>
+          </a:effectRef>
+          <a:fontRef idx="minor">
+            <a:schemeClr val="tx1"/>
+          </a:fontRef>
+        </p:style>
+      </p:cxnSp>
+      <p:sp>
+        <p:nvSpPr>
+          <p:cNvPr id="28" name="Seta: para Cima 27">
+            <a:extLst>
+              <a:ext uri="{FF2B5EF4-FFF2-40B4-BE49-F238E27FC236}">
+                <a16:creationId xmlns:a16="http://schemas.microsoft.com/office/drawing/2014/main" id="{E2A4DFBE-DF77-DD41-92AC-354A98CA0BA4}"/>
+              </a:ext>
+            </a:extLst>
+          </p:cNvPr>
+          <p:cNvSpPr/>
+          <p:nvPr/>
+        </p:nvSpPr>
+        <p:spPr>
+          <a:xfrm rot="16037579">
+            <a:off x="7873770" y="2832968"/>
+            <a:ext cx="953317" cy="396000"/>
+          </a:xfrm>
+          <a:prstGeom prst="upArrow">
+            <a:avLst>
+              <a:gd name="adj1" fmla="val 50000"/>
+              <a:gd name="adj2" fmla="val 65670"/>
+            </a:avLst>
+          </a:prstGeom>
+        </p:spPr>
+        <p:style>
+          <a:lnRef idx="2">
+            <a:schemeClr val="accent1">
+              <a:shade val="15000"/>
+            </a:schemeClr>
+          </a:lnRef>
+          <a:fillRef idx="1">
+            <a:schemeClr val="accent1"/>
+          </a:fillRef>
+          <a:effectRef idx="0">
+            <a:schemeClr val="accent1"/>
+          </a:effectRef>
+          <a:fontRef idx="minor">
+            <a:schemeClr val="lt1"/>
+          </a:fontRef>
+        </p:style>
+        <p:txBody>
+          <a:bodyPr rtlCol="0" anchor="ctr"/>
+          <a:lstStyle/>
+          <a:p>
+            <a:pPr algn="ctr"/>
+            <a:endParaRPr lang="pt-BR"/>
+          </a:p>
+        </p:txBody>
+      </p:sp>
+      <p:cxnSp>
+        <p:nvCxnSpPr>
+          <p:cNvPr id="33" name="Conector: Angulado 32">
+            <a:extLst>
+              <a:ext uri="{FF2B5EF4-FFF2-40B4-BE49-F238E27FC236}">
+                <a16:creationId xmlns:a16="http://schemas.microsoft.com/office/drawing/2014/main" id="{271ADBE9-9CD6-57A7-FD83-522EE21B5165}"/>
+              </a:ext>
+            </a:extLst>
+          </p:cNvPr>
+          <p:cNvCxnSpPr>
+            <a:cxnSpLocks/>
+            <a:stCxn id="16" idx="2"/>
+            <a:endCxn id="4" idx="2"/>
+          </p:cNvCxnSpPr>
+          <p:nvPr/>
+        </p:nvCxnSpPr>
+        <p:spPr>
+          <a:xfrm rot="16200000" flipH="1" flipV="1">
+            <a:off x="2036831" y="136518"/>
+            <a:ext cx="2866789" cy="6144224"/>
+          </a:xfrm>
+          <a:prstGeom prst="bentConnector4">
+            <a:avLst>
+              <a:gd name="adj1" fmla="val -4340"/>
+              <a:gd name="adj2" fmla="val 103820"/>
+            </a:avLst>
+          </a:prstGeom>
+          <a:ln w="76200" cap="flat" cmpd="sng" algn="ctr">
+            <a:solidFill>
+              <a:schemeClr val="accent1"/>
+            </a:solidFill>
+            <a:prstDash val="dash"/>
+            <a:round/>
+            <a:headEnd type="none" w="med" len="med"/>
+            <a:tailEnd type="none" w="med" len="med"/>
+          </a:ln>
+        </p:spPr>
+        <p:style>
+          <a:lnRef idx="0">
+            <a:scrgbClr r="0" g="0" b="0"/>
+          </a:lnRef>
+          <a:fillRef idx="0">
+            <a:scrgbClr r="0" g="0" b="0"/>
+          </a:fillRef>
+          <a:effectRef idx="0">
+            <a:scrgbClr r="0" g="0" b="0"/>
+          </a:effectRef>
+          <a:fontRef idx="minor">
+            <a:schemeClr val="tx1"/>
+          </a:fontRef>
+        </p:style>
+      </p:cxnSp>
+      <p:sp>
+        <p:nvSpPr>
+          <p:cNvPr id="39" name="CaixaDeTexto 38">
+            <a:extLst>
+              <a:ext uri="{FF2B5EF4-FFF2-40B4-BE49-F238E27FC236}">
+                <a16:creationId xmlns:a16="http://schemas.microsoft.com/office/drawing/2014/main" id="{DB5EAFF4-4F0F-6B7F-16E1-5EA447CCD6D6}"/>
+              </a:ext>
+            </a:extLst>
+          </p:cNvPr>
+          <p:cNvSpPr txBox="1"/>
+          <p:nvPr/>
+        </p:nvSpPr>
+        <p:spPr>
+          <a:xfrm rot="16200000" flipV="1">
+            <a:off x="8322696" y="3316133"/>
+            <a:ext cx="1097496" cy="369331"/>
+          </a:xfrm>
+          <a:prstGeom prst="rect">
+            <a:avLst/>
+          </a:prstGeom>
+          <a:noFill/>
+        </p:spPr>
+        <p:txBody>
+          <a:bodyPr wrap="square">
+            <a:spAutoFit/>
+          </a:bodyPr>
+          <a:lstStyle/>
+          <a:p>
+            <a:pPr algn="ctr"/>
+            <a:r>
+              <a:rPr lang="pt-BR" sz="1800" b="1" dirty="0">
+                <a:solidFill>
+                  <a:schemeClr val="accent6">
+                    <a:lumMod val="60000"/>
+                    <a:lumOff val="40000"/>
+                  </a:schemeClr>
+                </a:solidFill>
+              </a:rPr>
+              <a:t>Fontes</a:t>
+            </a:r>
+          </a:p>
+        </p:txBody>
+      </p:sp>
+      <p:sp>
+        <p:nvSpPr>
+          <p:cNvPr id="3" name="Espaço Reservado para Conteúdo 2">
+            <a:extLst>
+              <a:ext uri="{FF2B5EF4-FFF2-40B4-BE49-F238E27FC236}">
+                <a16:creationId xmlns:a16="http://schemas.microsoft.com/office/drawing/2014/main" id="{407653EB-2531-4C1F-6152-ADCFE19D52CD}"/>
+              </a:ext>
+            </a:extLst>
+          </p:cNvPr>
+          <p:cNvSpPr>
+            <a:spLocks noGrp="1"/>
+          </p:cNvSpPr>
+          <p:nvPr>
+            <p:ph idx="1"/>
+          </p:nvPr>
+        </p:nvSpPr>
+        <p:spPr>
+          <a:xfrm>
+            <a:off x="243068" y="5146764"/>
+            <a:ext cx="8657864" cy="1307993"/>
+          </a:xfrm>
+        </p:spPr>
+        <p:txBody>
+          <a:bodyPr>
+            <a:normAutofit fontScale="47500" lnSpcReduction="20000"/>
+          </a:bodyPr>
+          <a:lstStyle/>
+          <a:p>
+            <a:pPr algn="ctr">
+              <a:buFontTx/>
+              <a:buChar char="-"/>
+            </a:pPr>
+            <a:r>
+              <a:rPr lang="pt-BR" sz="3600" b="1" i="0" dirty="0">
+                <a:effectLst/>
+                <a:latin typeface="Glassdoor Sans"/>
+              </a:rPr>
+              <a:t>Desenvolvedor Trainee</a:t>
+            </a:r>
+            <a:r>
+              <a:rPr lang="pt-BR" sz="3600" b="1" dirty="0">
+                <a:latin typeface="Glassdoor Sans"/>
+              </a:rPr>
+              <a:t>, ou Junior:</a:t>
+            </a:r>
+            <a:r>
+              <a:rPr lang="pt-BR" sz="3600" b="1" i="0" dirty="0">
+                <a:effectLst/>
+                <a:latin typeface="Glassdoor Sans"/>
+              </a:rPr>
+              <a:t> R$2.800,00 - R$4.000,00 </a:t>
+            </a:r>
+            <a:r>
+              <a:rPr lang="pt-BR" sz="3600" b="1" dirty="0">
+                <a:latin typeface="Glassdoor Sans"/>
+              </a:rPr>
+              <a:t>por mês </a:t>
+            </a:r>
+            <a:r>
+              <a:rPr lang="pt-BR" sz="2400" b="1" i="0" dirty="0">
+                <a:effectLst/>
+                <a:latin typeface="Glassdoor Sans"/>
+              </a:rPr>
+              <a:t>(</a:t>
+            </a:r>
+            <a:r>
+              <a:rPr lang="pt-BR" sz="2400" b="1" i="0" dirty="0" err="1">
+                <a:effectLst/>
+                <a:latin typeface="Glassdoor Sans"/>
+              </a:rPr>
+              <a:t>Ibraflex</a:t>
+            </a:r>
+            <a:r>
+              <a:rPr lang="pt-BR" sz="2400" b="1" i="0" dirty="0">
+                <a:effectLst/>
+                <a:latin typeface="Glassdoor Sans"/>
+              </a:rPr>
+              <a:t>-Chapecó-</a:t>
+            </a:r>
+            <a:r>
+              <a:rPr lang="pt-BR" sz="2400" b="1" i="0" dirty="0" err="1">
+                <a:effectLst/>
+                <a:latin typeface="Glassdoor Sans"/>
+              </a:rPr>
+              <a:t>Glassdoor</a:t>
+            </a:r>
+            <a:r>
+              <a:rPr lang="pt-BR" sz="2400" b="1" i="0" dirty="0">
+                <a:effectLst/>
+                <a:latin typeface="Glassdoor Sans"/>
+              </a:rPr>
+              <a:t>)</a:t>
+            </a:r>
+          </a:p>
+          <a:p>
+            <a:pPr marL="0" indent="0" algn="ctr">
+              <a:buNone/>
+            </a:pPr>
+            <a:r>
+              <a:rPr lang="pt-BR" sz="4400" b="1" i="0" dirty="0">
+                <a:effectLst/>
+                <a:latin typeface="Glassdoor Sans"/>
+              </a:rPr>
+              <a:t>Fonte </a:t>
+            </a:r>
+          </a:p>
+          <a:p>
+            <a:pPr marL="0" indent="0" algn="ctr">
+              <a:buNone/>
+            </a:pPr>
+            <a:r>
+              <a:rPr lang="pt-BR" sz="4400" b="1" i="0" dirty="0">
+                <a:effectLst/>
+                <a:latin typeface="Glassdoor Sans"/>
+              </a:rPr>
+              <a:t>glassdoor.com</a:t>
+            </a:r>
+          </a:p>
+          <a:p>
+            <a:pPr marL="0" indent="0" algn="ctr">
+              <a:buNone/>
+            </a:pPr>
+            <a:r>
+              <a:rPr lang="pt-BR" sz="4400" b="1" dirty="0">
+                <a:latin typeface="Glassdoor Sans"/>
+              </a:rPr>
+              <a:t>Fevereiro/2025</a:t>
+            </a:r>
+            <a:r>
+              <a:rPr lang="pt-BR" sz="4400" b="1" i="0" dirty="0">
+                <a:effectLst/>
+                <a:latin typeface="Glassdoor Sans"/>
+              </a:rPr>
+              <a:t> </a:t>
+            </a:r>
+          </a:p>
+          <a:p>
+            <a:pPr algn="ctr">
+              <a:buFontTx/>
+              <a:buChar char="-"/>
+            </a:pPr>
+            <a:endParaRPr lang="pt-BR" sz="4400" b="1" i="1" dirty="0"/>
+          </a:p>
+          <a:p>
+            <a:pPr marL="128588" indent="-128588">
+              <a:buFont typeface="Wingdings" panose="05000000000000000000" pitchFamily="2" charset="2"/>
+              <a:buChar char="ü"/>
+            </a:pPr>
+            <a:endParaRPr lang="pt-BR" sz="2400" b="1" i="1" dirty="0"/>
+          </a:p>
+          <a:p>
+            <a:endParaRPr lang="pt-BR" dirty="0"/>
+          </a:p>
+        </p:txBody>
+      </p:sp>
+    </p:spTree>
+    <p:extLst>
+      <p:ext uri="{BB962C8B-B14F-4D97-AF65-F5344CB8AC3E}">
+        <p14:creationId xmlns:p14="http://schemas.microsoft.com/office/powerpoint/2010/main" val="3523880598"/>
+      </p:ext>
+    </p:extLst>
+  </p:cSld>
+  <p:clrMapOvr>
+    <a:masterClrMapping/>
+  </p:clrMapOvr>
+</p:sld>
+</file>
+
+<file path=ppt/slides/slide2.xml><?xml version="1.0" encoding="utf-8"?>
+<p:sld xmlns:a="http://schemas.openxmlformats.org/drawingml/2006/main" xmlns:r="http://schemas.openxmlformats.org/officeDocument/2006/relationships" xmlns:p="http://schemas.openxmlformats.org/presentationml/2006/main">
+  <p:cSld>
+    <p:bg>
+      <p:bgPr>
+        <a:solidFill>
+          <a:schemeClr val="bg1"/>
+        </a:solidFill>
+        <a:effectLst/>
+      </p:bgPr>
+    </p:bg>
+    <p:spTree>
+      <p:nvGrpSpPr>
+        <p:cNvPr id="1" name=""/>
+        <p:cNvGrpSpPr/>
+        <p:nvPr/>
+      </p:nvGrpSpPr>
+      <p:grpSpPr>
+        <a:xfrm>
+          <a:off x="0" y="0"/>
+          <a:ext cx="0" cy="0"/>
+          <a:chOff x="0" y="0"/>
+          <a:chExt cx="0" cy="0"/>
+        </a:xfrm>
+      </p:grpSpPr>
+      <p:sp useBgFill="1">
+        <p:nvSpPr>
+          <p:cNvPr id="10" name="Rectangle 9">
+            <a:extLst>
+              <a:ext uri="{FF2B5EF4-FFF2-40B4-BE49-F238E27FC236}">
+                <a16:creationId xmlns:a16="http://schemas.microsoft.com/office/drawing/2014/main" id="{9D25F302-27C5-414F-97F8-6EA0A6C028BA}"/>
+              </a:ext>
+              <a:ext uri="{C183D7F6-B498-43B3-948B-1728B52AA6E4}">
+                <adec:decorative xmlns:adec="http://schemas.microsoft.com/office/drawing/2017/decorative" val="1"/>
+              </a:ext>
+            </a:extLst>
+          </p:cNvPr>
+          <p:cNvSpPr>
+            <a:spLocks noGrp="1" noRot="1" noChangeAspect="1" noMove="1" noResize="1" noEditPoints="1" noAdjustHandles="1" noChangeArrowheads="1" noChangeShapeType="1" noTextEdit="1"/>
+          </p:cNvSpPr>
+          <p:nvPr>
+            <p:extLst>
+              <p:ext uri="{386F3935-93C4-4BCD-93E2-E3B085C9AB24}">
+                <p16:designElem xmlns:p16="http://schemas.microsoft.com/office/powerpoint/2015/main" val="1"/>
+              </p:ext>
+            </p:extLst>
+          </p:nvPr>
+        </p:nvSpPr>
+        <p:spPr>
+          <a:xfrm>
+            <a:off x="0" y="0"/>
+            <a:ext cx="9144000" cy="6858000"/>
+          </a:xfrm>
+          <a:prstGeom prst="rect">
+            <a:avLst/>
+          </a:prstGeom>
+          <a:ln>
+            <a:noFill/>
+          </a:ln>
+        </p:spPr>
+        <p:style>
+          <a:lnRef idx="2">
+            <a:schemeClr val="accent1">
+              <a:shade val="50000"/>
+            </a:schemeClr>
+          </a:lnRef>
+          <a:fillRef idx="1">
+            <a:schemeClr val="accent1"/>
+          </a:fillRef>
+          <a:effectRef idx="0">
+            <a:schemeClr val="accent1"/>
+          </a:effectRef>
+          <a:fontRef idx="minor">
+            <a:schemeClr val="lt1"/>
+          </a:fontRef>
+        </p:style>
+        <p:txBody>
+          <a:bodyPr rtlCol="0" anchor="ctr"/>
+          <a:lstStyle/>
+          <a:p>
+            <a:pPr algn="ctr"/>
+            <a:endParaRPr lang="en-US"/>
+          </a:p>
+        </p:txBody>
+      </p:sp>
+      <p:sp>
+        <p:nvSpPr>
+          <p:cNvPr id="12" name="Right Triangle 11">
+            <a:extLst>
+              <a:ext uri="{FF2B5EF4-FFF2-40B4-BE49-F238E27FC236}">
+                <a16:creationId xmlns:a16="http://schemas.microsoft.com/office/drawing/2014/main" id="{830A36F8-48C2-4842-A87B-8CE8DF4E7FD2}"/>
+              </a:ext>
+              <a:ext uri="{C183D7F6-B498-43B3-948B-1728B52AA6E4}">
+                <adec:decorative xmlns:adec="http://schemas.microsoft.com/office/drawing/2017/decorative" val="1"/>
+              </a:ext>
+            </a:extLst>
+          </p:cNvPr>
+          <p:cNvSpPr>
+            <a:spLocks noGrp="1" noRot="1" noChangeAspect="1" noMove="1" noResize="1" noEditPoints="1" noAdjustHandles="1" noChangeArrowheads="1" noChangeShapeType="1" noTextEdit="1"/>
+          </p:cNvSpPr>
+          <p:nvPr>
+            <p:extLst>
+              <p:ext uri="{386F3935-93C4-4BCD-93E2-E3B085C9AB24}">
+                <p16:designElem xmlns:p16="http://schemas.microsoft.com/office/powerpoint/2015/main" val="1"/>
+              </p:ext>
+            </p:extLst>
+          </p:nvPr>
+        </p:nvSpPr>
+        <p:spPr>
+          <a:xfrm flipH="1">
+            <a:off x="6432540" y="3335867"/>
+            <a:ext cx="2468880" cy="3200400"/>
+          </a:xfrm>
+          <a:prstGeom prst="rtTriangle">
+            <a:avLst/>
+          </a:prstGeom>
+          <a:solidFill>
+            <a:schemeClr val="accent4"/>
+          </a:solidFill>
+          <a:ln>
+            <a:noFill/>
+          </a:ln>
+        </p:spPr>
+        <p:style>
+          <a:lnRef idx="2">
+            <a:schemeClr val="accent1">
+              <a:shade val="50000"/>
+            </a:schemeClr>
+          </a:lnRef>
+          <a:fillRef idx="1">
+            <a:schemeClr val="accent1"/>
+          </a:fillRef>
+          <a:effectRef idx="0">
+            <a:schemeClr val="accent1"/>
+          </a:effectRef>
+          <a:fontRef idx="minor">
+            <a:schemeClr val="lt1"/>
+          </a:fontRef>
+        </p:style>
+        <p:txBody>
+          <a:bodyPr rtlCol="0" anchor="ctr"/>
+          <a:lstStyle/>
+          <a:p>
+            <a:pPr algn="ctr"/>
+            <a:endParaRPr lang="en-US" dirty="0"/>
+          </a:p>
+        </p:txBody>
+      </p:sp>
+      <p:sp>
+        <p:nvSpPr>
+          <p:cNvPr id="14" name="Rectangle 13">
+            <a:extLst>
+              <a:ext uri="{FF2B5EF4-FFF2-40B4-BE49-F238E27FC236}">
+                <a16:creationId xmlns:a16="http://schemas.microsoft.com/office/drawing/2014/main" id="{8F451A30-466B-4996-9BA5-CD6ABCC6D558}"/>
+              </a:ext>
+              <a:ext uri="{C183D7F6-B498-43B3-948B-1728B52AA6E4}">
+                <adec:decorative xmlns:adec="http://schemas.microsoft.com/office/drawing/2017/decorative" val="1"/>
+              </a:ext>
+            </a:extLst>
+          </p:cNvPr>
+          <p:cNvSpPr>
+            <a:spLocks noGrp="1" noRot="1" noChangeAspect="1" noMove="1" noResize="1" noEditPoints="1" noAdjustHandles="1" noChangeArrowheads="1" noChangeShapeType="1" noTextEdit="1"/>
+          </p:cNvSpPr>
+          <p:nvPr>
+            <p:extLst>
+              <p:ext uri="{386F3935-93C4-4BCD-93E2-E3B085C9AB24}">
+                <p16:designElem xmlns:p16="http://schemas.microsoft.com/office/powerpoint/2015/main" val="1"/>
+              </p:ext>
+            </p:extLst>
+          </p:nvPr>
+        </p:nvSpPr>
+        <p:spPr>
+          <a:xfrm>
+            <a:off x="481330" y="623275"/>
+            <a:ext cx="8178790" cy="5607882"/>
+          </a:xfrm>
+          <a:prstGeom prst="rect">
+            <a:avLst/>
+          </a:prstGeom>
+          <a:noFill/>
+          <a:ln w="19050">
+            <a:solidFill>
+              <a:schemeClr val="tx1">
+                <a:lumMod val="75000"/>
+                <a:lumOff val="25000"/>
+              </a:schemeClr>
+            </a:solidFill>
+          </a:ln>
+        </p:spPr>
+        <p:style>
+          <a:lnRef idx="2">
+            <a:schemeClr val="accent1">
+              <a:shade val="50000"/>
+            </a:schemeClr>
+          </a:lnRef>
+          <a:fillRef idx="1">
+            <a:schemeClr val="accent1"/>
+          </a:fillRef>
+          <a:effectRef idx="0">
+            <a:schemeClr val="accent1"/>
+          </a:effectRef>
+          <a:fontRef idx="minor">
+            <a:schemeClr val="lt1"/>
+          </a:fontRef>
+        </p:style>
+        <p:txBody>
+          <a:bodyPr rtlCol="0" anchor="ctr"/>
+          <a:lstStyle/>
+          <a:p>
+            <a:pPr algn="ctr"/>
+            <a:endParaRPr lang="en-US"/>
+          </a:p>
+        </p:txBody>
+      </p:sp>
+      <p:sp>
+        <p:nvSpPr>
+          <p:cNvPr id="2" name="Título 1">
+            <a:extLst>
+              <a:ext uri="{FF2B5EF4-FFF2-40B4-BE49-F238E27FC236}">
+                <a16:creationId xmlns:a16="http://schemas.microsoft.com/office/drawing/2014/main" id="{65930D16-6817-09ED-42C9-AD543FE271DB}"/>
+              </a:ext>
+            </a:extLst>
+          </p:cNvPr>
+          <p:cNvSpPr>
+            <a:spLocks noGrp="1"/>
+          </p:cNvSpPr>
+          <p:nvPr>
+            <p:ph type="title"/>
+          </p:nvPr>
+        </p:nvSpPr>
+        <p:spPr>
+          <a:xfrm>
+            <a:off x="3941445" y="1188637"/>
+            <a:ext cx="4389533" cy="1597228"/>
+          </a:xfrm>
+        </p:spPr>
+        <p:txBody>
+          <a:bodyPr>
+            <a:normAutofit/>
+          </a:bodyPr>
+          <a:lstStyle/>
+          <a:p>
+            <a:r>
+              <a:rPr lang="pt-BR" sz="3600" b="1">
+                <a:latin typeface="wfont_2e4939_6f7a5545f5df428c83b5d6af186eca87"/>
+              </a:rPr>
+              <a:t>Vice-presidência de Apoio e Infraestrutura</a:t>
+            </a:r>
+            <a:endParaRPr lang="pt-BR" sz="3600" b="1"/>
+          </a:p>
+        </p:txBody>
+      </p:sp>
+      <p:sp>
+        <p:nvSpPr>
+          <p:cNvPr id="4" name="Espaço Reservado para Rodapé 3">
+            <a:extLst>
+              <a:ext uri="{FF2B5EF4-FFF2-40B4-BE49-F238E27FC236}">
+                <a16:creationId xmlns:a16="http://schemas.microsoft.com/office/drawing/2014/main" id="{69107A0B-A525-B186-70D5-F0CEA3DDC630}"/>
+              </a:ext>
+            </a:extLst>
+          </p:cNvPr>
+          <p:cNvSpPr>
+            <a:spLocks noGrp="1"/>
+          </p:cNvSpPr>
+          <p:nvPr>
+            <p:ph type="ftr" sz="quarter" idx="11"/>
+          </p:nvPr>
+        </p:nvSpPr>
+        <p:spPr>
+          <a:xfrm rot="5400000">
+            <a:off x="-1781124" y="3246436"/>
+            <a:ext cx="4205910" cy="365125"/>
+          </a:xfrm>
+        </p:spPr>
+        <p:txBody>
+          <a:bodyPr anchor="t">
+            <a:normAutofit/>
+          </a:bodyPr>
+          <a:lstStyle/>
+          <a:p>
+            <a:pPr algn="l">
+              <a:spcAft>
+                <a:spcPts val="600"/>
+              </a:spcAft>
+            </a:pPr>
+            <a:r>
+              <a:rPr lang="en-US" sz="1000">
+                <a:solidFill>
+                  <a:schemeClr val="tx1">
+                    <a:lumMod val="85000"/>
+                    <a:lumOff val="15000"/>
+                  </a:schemeClr>
+                </a:solidFill>
+              </a:rPr>
+              <a:t>ALVF – Associação Hospitalar Lenoir Vargas Ferreira</a:t>
+            </a:r>
+          </a:p>
+        </p:txBody>
+      </p:sp>
+      <p:pic>
+        <p:nvPicPr>
+          <p:cNvPr id="5" name="Imagem 4" descr="Placa azul com letras brancas em fundo preto&#10;&#10;O conteúdo gerado por IA pode estar incorreto.">
+            <a:extLst>
+              <a:ext uri="{FF2B5EF4-FFF2-40B4-BE49-F238E27FC236}">
+                <a16:creationId xmlns:a16="http://schemas.microsoft.com/office/drawing/2014/main" id="{36995072-0722-B22C-9C5D-70528312AFC2}"/>
+              </a:ext>
+            </a:extLst>
+          </p:cNvPr>
+          <p:cNvPicPr>
+            <a:picLocks noChangeAspect="1"/>
+          </p:cNvPicPr>
+          <p:nvPr/>
+        </p:nvPicPr>
+        <p:blipFill>
+          <a:blip r:embed="rId2"/>
+          <a:stretch>
+            <a:fillRect/>
+          </a:stretch>
+        </p:blipFill>
+        <p:spPr>
+          <a:xfrm>
+            <a:off x="842517" y="2739331"/>
+            <a:ext cx="2650489" cy="1456499"/>
+          </a:xfrm>
+          <a:prstGeom prst="rect">
+            <a:avLst/>
+          </a:prstGeom>
+        </p:spPr>
+      </p:pic>
+      <p:sp>
+        <p:nvSpPr>
+          <p:cNvPr id="3" name="Espaço Reservado para Conteúdo 2">
+            <a:extLst>
+              <a:ext uri="{FF2B5EF4-FFF2-40B4-BE49-F238E27FC236}">
+                <a16:creationId xmlns:a16="http://schemas.microsoft.com/office/drawing/2014/main" id="{3C36773A-070B-65AB-FBB7-23F92196CDDE}"/>
+              </a:ext>
+            </a:extLst>
+          </p:cNvPr>
+          <p:cNvSpPr>
+            <a:spLocks noGrp="1"/>
+          </p:cNvSpPr>
+          <p:nvPr>
+            <p:ph idx="1"/>
+          </p:nvPr>
+        </p:nvSpPr>
+        <p:spPr>
+          <a:xfrm>
+            <a:off x="3941445" y="2998278"/>
+            <a:ext cx="3321177" cy="2728198"/>
+          </a:xfrm>
+        </p:spPr>
+        <p:txBody>
+          <a:bodyPr anchor="t">
+            <a:normAutofit/>
+          </a:bodyPr>
+          <a:lstStyle/>
+          <a:p>
+            <a:pPr>
+              <a:spcBef>
+                <a:spcPts val="0"/>
+              </a:spcBef>
+              <a:spcAft>
+                <a:spcPts val="600"/>
+              </a:spcAft>
+            </a:pPr>
+            <a:r>
+              <a:rPr lang="pt-BR" sz="1700" dirty="0">
+                <a:latin typeface="wfont_2e4939_6f7a5545f5df428c83b5d6af186eca87"/>
+              </a:rPr>
+              <a:t>Vice-presidente: </a:t>
+            </a:r>
+            <a:r>
+              <a:rPr lang="pt-BR" sz="1700" b="1" dirty="0">
+                <a:latin typeface="wfont_2e4939_810417c1ed7845d798a58c19c12c0f7e"/>
+              </a:rPr>
+              <a:t>Mauro </a:t>
+            </a:r>
+            <a:r>
+              <a:rPr lang="pt-BR" sz="1700" b="1">
+                <a:latin typeface="wfont_2e4939_810417c1ed7845d798a58c19c12c0f7e"/>
+              </a:rPr>
+              <a:t>Concatto</a:t>
+            </a:r>
+            <a:endParaRPr lang="pt-BR" sz="1700" b="1" dirty="0">
+              <a:latin typeface="wfont_2e4939_6f7a5545f5df428c83b5d6af186eca87"/>
+            </a:endParaRPr>
+          </a:p>
+          <a:p>
+            <a:pPr>
+              <a:spcBef>
+                <a:spcPts val="0"/>
+              </a:spcBef>
+              <a:spcAft>
+                <a:spcPts val="600"/>
+              </a:spcAft>
+            </a:pPr>
+            <a:r>
+              <a:rPr lang="pt-BR" sz="1700" dirty="0"/>
+              <a:t>Como adjunto (para este projeto): </a:t>
+            </a:r>
+            <a:r>
+              <a:rPr lang="pt-BR" sz="1700" b="1" dirty="0"/>
+              <a:t>Radamés Pereira (autor)</a:t>
+            </a:r>
+          </a:p>
+        </p:txBody>
+      </p:sp>
+    </p:spTree>
+    <p:extLst>
+      <p:ext uri="{BB962C8B-B14F-4D97-AF65-F5344CB8AC3E}">
+        <p14:creationId xmlns:p14="http://schemas.microsoft.com/office/powerpoint/2010/main" val="1893570066"/>
+      </p:ext>
+    </p:extLst>
+  </p:cSld>
+  <p:clrMapOvr>
+    <a:masterClrMapping/>
+  </p:clrMapOvr>
+</p:sld>
+</file>
+
+<file path=ppt/slides/slide20.xml><?xml version="1.0" encoding="utf-8"?>
+<p:sld xmlns:a="http://schemas.openxmlformats.org/drawingml/2006/main" xmlns:r="http://schemas.openxmlformats.org/officeDocument/2006/relationships" xmlns:p="http://schemas.openxmlformats.org/presentationml/2006/main">
+  <p:cSld>
+    <p:spTree>
+      <p:nvGrpSpPr>
+        <p:cNvPr id="1" name=""/>
+        <p:cNvGrpSpPr/>
+        <p:nvPr/>
+      </p:nvGrpSpPr>
+      <p:grpSpPr>
+        <a:xfrm>
+          <a:off x="0" y="0"/>
+          <a:ext cx="0" cy="0"/>
+          <a:chOff x="0" y="0"/>
+          <a:chExt cx="0" cy="0"/>
+        </a:xfrm>
+      </p:grpSpPr>
+      <p:sp>
+        <p:nvSpPr>
+          <p:cNvPr id="2" name="Título 1">
+            <a:extLst>
+              <a:ext uri="{FF2B5EF4-FFF2-40B4-BE49-F238E27FC236}">
                 <a16:creationId xmlns:a16="http://schemas.microsoft.com/office/drawing/2014/main" id="{01BA4A59-818C-69C7-7FAC-6035F62A7D3F}"/>
               </a:ext>
             </a:extLst>
@@ -23231,427 +24664,7 @@
 </p:sld>
 </file>
 
-<file path=ppt/slides/slide2.xml><?xml version="1.0" encoding="utf-8"?>
-<p:sld xmlns:a="http://schemas.openxmlformats.org/drawingml/2006/main" xmlns:r="http://schemas.openxmlformats.org/officeDocument/2006/relationships" xmlns:p="http://schemas.openxmlformats.org/presentationml/2006/main">
-  <p:cSld>
-    <p:bg>
-      <p:bgPr>
-        <a:solidFill>
-          <a:schemeClr val="bg1"/>
-        </a:solidFill>
-        <a:effectLst/>
-      </p:bgPr>
-    </p:bg>
-    <p:spTree>
-      <p:nvGrpSpPr>
-        <p:cNvPr id="1" name=""/>
-        <p:cNvGrpSpPr/>
-        <p:nvPr/>
-      </p:nvGrpSpPr>
-      <p:grpSpPr>
-        <a:xfrm>
-          <a:off x="0" y="0"/>
-          <a:ext cx="0" cy="0"/>
-          <a:chOff x="0" y="0"/>
-          <a:chExt cx="0" cy="0"/>
-        </a:xfrm>
-      </p:grpSpPr>
-      <p:sp useBgFill="1">
-        <p:nvSpPr>
-          <p:cNvPr id="10" name="Rectangle 9">
-            <a:extLst>
-              <a:ext uri="{FF2B5EF4-FFF2-40B4-BE49-F238E27FC236}">
-                <a16:creationId xmlns:a16="http://schemas.microsoft.com/office/drawing/2014/main" id="{9D25F302-27C5-414F-97F8-6EA0A6C028BA}"/>
-              </a:ext>
-              <a:ext uri="{C183D7F6-B498-43B3-948B-1728B52AA6E4}">
-                <adec:decorative xmlns:adec="http://schemas.microsoft.com/office/drawing/2017/decorative" val="1"/>
-              </a:ext>
-            </a:extLst>
-          </p:cNvPr>
-          <p:cNvSpPr>
-            <a:spLocks noGrp="1" noRot="1" noChangeAspect="1" noMove="1" noResize="1" noEditPoints="1" noAdjustHandles="1" noChangeArrowheads="1" noChangeShapeType="1" noTextEdit="1"/>
-          </p:cNvSpPr>
-          <p:nvPr>
-            <p:extLst>
-              <p:ext uri="{386F3935-93C4-4BCD-93E2-E3B085C9AB24}">
-                <p16:designElem xmlns:p16="http://schemas.microsoft.com/office/powerpoint/2015/main" val="1"/>
-              </p:ext>
-            </p:extLst>
-          </p:nvPr>
-        </p:nvSpPr>
-        <p:spPr>
-          <a:xfrm>
-            <a:off x="0" y="0"/>
-            <a:ext cx="9144000" cy="6858000"/>
-          </a:xfrm>
-          <a:prstGeom prst="rect">
-            <a:avLst/>
-          </a:prstGeom>
-          <a:ln>
-            <a:noFill/>
-          </a:ln>
-        </p:spPr>
-        <p:style>
-          <a:lnRef idx="2">
-            <a:schemeClr val="accent1">
-              <a:shade val="50000"/>
-            </a:schemeClr>
-          </a:lnRef>
-          <a:fillRef idx="1">
-            <a:schemeClr val="accent1"/>
-          </a:fillRef>
-          <a:effectRef idx="0">
-            <a:schemeClr val="accent1"/>
-          </a:effectRef>
-          <a:fontRef idx="minor">
-            <a:schemeClr val="lt1"/>
-          </a:fontRef>
-        </p:style>
-        <p:txBody>
-          <a:bodyPr rtlCol="0" anchor="ctr"/>
-          <a:lstStyle/>
-          <a:p>
-            <a:pPr algn="ctr"/>
-            <a:endParaRPr lang="en-US"/>
-          </a:p>
-        </p:txBody>
-      </p:sp>
-      <p:sp>
-        <p:nvSpPr>
-          <p:cNvPr id="12" name="Right Triangle 11">
-            <a:extLst>
-              <a:ext uri="{FF2B5EF4-FFF2-40B4-BE49-F238E27FC236}">
-                <a16:creationId xmlns:a16="http://schemas.microsoft.com/office/drawing/2014/main" id="{830A36F8-48C2-4842-A87B-8CE8DF4E7FD2}"/>
-              </a:ext>
-              <a:ext uri="{C183D7F6-B498-43B3-948B-1728B52AA6E4}">
-                <adec:decorative xmlns:adec="http://schemas.microsoft.com/office/drawing/2017/decorative" val="1"/>
-              </a:ext>
-            </a:extLst>
-          </p:cNvPr>
-          <p:cNvSpPr>
-            <a:spLocks noGrp="1" noRot="1" noChangeAspect="1" noMove="1" noResize="1" noEditPoints="1" noAdjustHandles="1" noChangeArrowheads="1" noChangeShapeType="1" noTextEdit="1"/>
-          </p:cNvSpPr>
-          <p:nvPr>
-            <p:extLst>
-              <p:ext uri="{386F3935-93C4-4BCD-93E2-E3B085C9AB24}">
-                <p16:designElem xmlns:p16="http://schemas.microsoft.com/office/powerpoint/2015/main" val="1"/>
-              </p:ext>
-            </p:extLst>
-          </p:nvPr>
-        </p:nvSpPr>
-        <p:spPr>
-          <a:xfrm flipH="1">
-            <a:off x="6432540" y="3335867"/>
-            <a:ext cx="2468880" cy="3200400"/>
-          </a:xfrm>
-          <a:prstGeom prst="rtTriangle">
-            <a:avLst/>
-          </a:prstGeom>
-          <a:solidFill>
-            <a:schemeClr val="accent4"/>
-          </a:solidFill>
-          <a:ln>
-            <a:noFill/>
-          </a:ln>
-        </p:spPr>
-        <p:style>
-          <a:lnRef idx="2">
-            <a:schemeClr val="accent1">
-              <a:shade val="50000"/>
-            </a:schemeClr>
-          </a:lnRef>
-          <a:fillRef idx="1">
-            <a:schemeClr val="accent1"/>
-          </a:fillRef>
-          <a:effectRef idx="0">
-            <a:schemeClr val="accent1"/>
-          </a:effectRef>
-          <a:fontRef idx="minor">
-            <a:schemeClr val="lt1"/>
-          </a:fontRef>
-        </p:style>
-        <p:txBody>
-          <a:bodyPr rtlCol="0" anchor="ctr"/>
-          <a:lstStyle/>
-          <a:p>
-            <a:pPr algn="ctr"/>
-            <a:endParaRPr lang="en-US" dirty="0"/>
-          </a:p>
-        </p:txBody>
-      </p:sp>
-      <p:sp>
-        <p:nvSpPr>
-          <p:cNvPr id="14" name="Rectangle 13">
-            <a:extLst>
-              <a:ext uri="{FF2B5EF4-FFF2-40B4-BE49-F238E27FC236}">
-                <a16:creationId xmlns:a16="http://schemas.microsoft.com/office/drawing/2014/main" id="{8F451A30-466B-4996-9BA5-CD6ABCC6D558}"/>
-              </a:ext>
-              <a:ext uri="{C183D7F6-B498-43B3-948B-1728B52AA6E4}">
-                <adec:decorative xmlns:adec="http://schemas.microsoft.com/office/drawing/2017/decorative" val="1"/>
-              </a:ext>
-            </a:extLst>
-          </p:cNvPr>
-          <p:cNvSpPr>
-            <a:spLocks noGrp="1" noRot="1" noChangeAspect="1" noMove="1" noResize="1" noEditPoints="1" noAdjustHandles="1" noChangeArrowheads="1" noChangeShapeType="1" noTextEdit="1"/>
-          </p:cNvSpPr>
-          <p:nvPr>
-            <p:extLst>
-              <p:ext uri="{386F3935-93C4-4BCD-93E2-E3B085C9AB24}">
-                <p16:designElem xmlns:p16="http://schemas.microsoft.com/office/powerpoint/2015/main" val="1"/>
-              </p:ext>
-            </p:extLst>
-          </p:nvPr>
-        </p:nvSpPr>
-        <p:spPr>
-          <a:xfrm>
-            <a:off x="481330" y="623275"/>
-            <a:ext cx="8178790" cy="5607882"/>
-          </a:xfrm>
-          <a:prstGeom prst="rect">
-            <a:avLst/>
-          </a:prstGeom>
-          <a:noFill/>
-          <a:ln w="19050">
-            <a:solidFill>
-              <a:schemeClr val="tx1">
-                <a:lumMod val="75000"/>
-                <a:lumOff val="25000"/>
-              </a:schemeClr>
-            </a:solidFill>
-          </a:ln>
-        </p:spPr>
-        <p:style>
-          <a:lnRef idx="2">
-            <a:schemeClr val="accent1">
-              <a:shade val="50000"/>
-            </a:schemeClr>
-          </a:lnRef>
-          <a:fillRef idx="1">
-            <a:schemeClr val="accent1"/>
-          </a:fillRef>
-          <a:effectRef idx="0">
-            <a:schemeClr val="accent1"/>
-          </a:effectRef>
-          <a:fontRef idx="minor">
-            <a:schemeClr val="lt1"/>
-          </a:fontRef>
-        </p:style>
-        <p:txBody>
-          <a:bodyPr rtlCol="0" anchor="ctr"/>
-          <a:lstStyle/>
-          <a:p>
-            <a:pPr algn="ctr"/>
-            <a:endParaRPr lang="en-US"/>
-          </a:p>
-        </p:txBody>
-      </p:sp>
-      <p:sp>
-        <p:nvSpPr>
-          <p:cNvPr id="2" name="Título 1">
-            <a:extLst>
-              <a:ext uri="{FF2B5EF4-FFF2-40B4-BE49-F238E27FC236}">
-                <a16:creationId xmlns:a16="http://schemas.microsoft.com/office/drawing/2014/main" id="{65930D16-6817-09ED-42C9-AD543FE271DB}"/>
-              </a:ext>
-            </a:extLst>
-          </p:cNvPr>
-          <p:cNvSpPr>
-            <a:spLocks noGrp="1"/>
-          </p:cNvSpPr>
-          <p:nvPr>
-            <p:ph type="title"/>
-          </p:nvPr>
-        </p:nvSpPr>
-        <p:spPr>
-          <a:xfrm>
-            <a:off x="3941445" y="1188637"/>
-            <a:ext cx="4389533" cy="1597228"/>
-          </a:xfrm>
-        </p:spPr>
-        <p:txBody>
-          <a:bodyPr>
-            <a:normAutofit/>
-          </a:bodyPr>
-          <a:lstStyle/>
-          <a:p>
-            <a:r>
-              <a:rPr lang="pt-BR" sz="3600" b="1">
-                <a:latin typeface="wfont_2e4939_6f7a5545f5df428c83b5d6af186eca87"/>
-              </a:rPr>
-              <a:t>Vice-presidência de Apoio e Infraestrutura</a:t>
-            </a:r>
-            <a:endParaRPr lang="pt-BR" sz="3600" b="1"/>
-          </a:p>
-        </p:txBody>
-      </p:sp>
-      <p:sp>
-        <p:nvSpPr>
-          <p:cNvPr id="4" name="Espaço Reservado para Rodapé 3">
-            <a:extLst>
-              <a:ext uri="{FF2B5EF4-FFF2-40B4-BE49-F238E27FC236}">
-                <a16:creationId xmlns:a16="http://schemas.microsoft.com/office/drawing/2014/main" id="{69107A0B-A525-B186-70D5-F0CEA3DDC630}"/>
-              </a:ext>
-            </a:extLst>
-          </p:cNvPr>
-          <p:cNvSpPr>
-            <a:spLocks noGrp="1"/>
-          </p:cNvSpPr>
-          <p:nvPr>
-            <p:ph type="ftr" sz="quarter" idx="11"/>
-          </p:nvPr>
-        </p:nvSpPr>
-        <p:spPr>
-          <a:xfrm rot="5400000">
-            <a:off x="-1781124" y="3246436"/>
-            <a:ext cx="4205910" cy="365125"/>
-          </a:xfrm>
-        </p:spPr>
-        <p:txBody>
-          <a:bodyPr anchor="t">
-            <a:normAutofit/>
-          </a:bodyPr>
-          <a:lstStyle/>
-          <a:p>
-            <a:pPr algn="l">
-              <a:spcAft>
-                <a:spcPts val="600"/>
-              </a:spcAft>
-            </a:pPr>
-            <a:r>
-              <a:rPr lang="en-US" sz="1000">
-                <a:solidFill>
-                  <a:schemeClr val="tx1">
-                    <a:lumMod val="85000"/>
-                    <a:lumOff val="15000"/>
-                  </a:schemeClr>
-                </a:solidFill>
-              </a:rPr>
-              <a:t>ALVF – Associação Hospitalar Lenoir Vargas Ferreira</a:t>
-            </a:r>
-          </a:p>
-        </p:txBody>
-      </p:sp>
-      <p:pic>
-        <p:nvPicPr>
-          <p:cNvPr id="5" name="Imagem 4" descr="Placa azul com letras brancas em fundo preto&#10;&#10;O conteúdo gerado por IA pode estar incorreto.">
-            <a:extLst>
-              <a:ext uri="{FF2B5EF4-FFF2-40B4-BE49-F238E27FC236}">
-                <a16:creationId xmlns:a16="http://schemas.microsoft.com/office/drawing/2014/main" id="{36995072-0722-B22C-9C5D-70528312AFC2}"/>
-              </a:ext>
-            </a:extLst>
-          </p:cNvPr>
-          <p:cNvPicPr>
-            <a:picLocks noChangeAspect="1"/>
-          </p:cNvPicPr>
-          <p:nvPr/>
-        </p:nvPicPr>
-        <p:blipFill>
-          <a:blip r:embed="rId2"/>
-          <a:stretch>
-            <a:fillRect/>
-          </a:stretch>
-        </p:blipFill>
-        <p:spPr>
-          <a:xfrm>
-            <a:off x="842517" y="2739331"/>
-            <a:ext cx="2650489" cy="1456499"/>
-          </a:xfrm>
-          <a:prstGeom prst="rect">
-            <a:avLst/>
-          </a:prstGeom>
-        </p:spPr>
-      </p:pic>
-      <p:sp>
-        <p:nvSpPr>
-          <p:cNvPr id="3" name="Espaço Reservado para Conteúdo 2">
-            <a:extLst>
-              <a:ext uri="{FF2B5EF4-FFF2-40B4-BE49-F238E27FC236}">
-                <a16:creationId xmlns:a16="http://schemas.microsoft.com/office/drawing/2014/main" id="{3C36773A-070B-65AB-FBB7-23F92196CDDE}"/>
-              </a:ext>
-            </a:extLst>
-          </p:cNvPr>
-          <p:cNvSpPr>
-            <a:spLocks noGrp="1"/>
-          </p:cNvSpPr>
-          <p:nvPr>
-            <p:ph idx="1"/>
-          </p:nvPr>
-        </p:nvSpPr>
-        <p:spPr>
-          <a:xfrm>
-            <a:off x="3941445" y="2998278"/>
-            <a:ext cx="3321177" cy="2728198"/>
-          </a:xfrm>
-        </p:spPr>
-        <p:txBody>
-          <a:bodyPr anchor="t">
-            <a:normAutofit/>
-          </a:bodyPr>
-          <a:lstStyle/>
-          <a:p>
-            <a:pPr>
-              <a:spcBef>
-                <a:spcPts val="0"/>
-              </a:spcBef>
-              <a:spcAft>
-                <a:spcPts val="600"/>
-              </a:spcAft>
-            </a:pPr>
-            <a:r>
-              <a:rPr lang="pt-BR" sz="1700" dirty="0">
-                <a:latin typeface="wfont_2e4939_6f7a5545f5df428c83b5d6af186eca87"/>
-              </a:rPr>
-              <a:t>Vice-presidente: </a:t>
-            </a:r>
-            <a:r>
-              <a:rPr lang="pt-BR" sz="1700" b="1" dirty="0">
-                <a:latin typeface="wfont_2e4939_810417c1ed7845d798a58c19c12c0f7e"/>
-              </a:rPr>
-              <a:t>Mauro </a:t>
-            </a:r>
-            <a:r>
-              <a:rPr lang="pt-BR" sz="1700" b="1">
-                <a:latin typeface="wfont_2e4939_810417c1ed7845d798a58c19c12c0f7e"/>
-              </a:rPr>
-              <a:t>Concatto</a:t>
-            </a:r>
-            <a:endParaRPr lang="pt-BR" sz="1700" b="1" dirty="0">
-              <a:latin typeface="wfont_2e4939_6f7a5545f5df428c83b5d6af186eca87"/>
-            </a:endParaRPr>
-          </a:p>
-          <a:p>
-            <a:pPr>
-              <a:spcBef>
-                <a:spcPts val="0"/>
-              </a:spcBef>
-              <a:spcAft>
-                <a:spcPts val="600"/>
-              </a:spcAft>
-            </a:pPr>
-            <a:r>
-              <a:rPr lang="pt-BR" sz="1700" dirty="0"/>
-              <a:t>Como adjunto (para este projeto): </a:t>
-            </a:r>
-            <a:r>
-              <a:rPr lang="pt-BR" sz="1700" b="1" dirty="0"/>
-              <a:t>Radamés Pereira (autor)</a:t>
-            </a:r>
-          </a:p>
-        </p:txBody>
-      </p:sp>
-    </p:spTree>
-    <p:extLst>
-      <p:ext uri="{BB962C8B-B14F-4D97-AF65-F5344CB8AC3E}">
-        <p14:creationId xmlns:p14="http://schemas.microsoft.com/office/powerpoint/2010/main" val="1893570066"/>
-      </p:ext>
-    </p:extLst>
-  </p:cSld>
-  <p:clrMapOvr>
-    <a:masterClrMapping/>
-  </p:clrMapOvr>
-</p:sld>
-</file>
-
-<file path=ppt/slides/slide20.xml><?xml version="1.0" encoding="utf-8"?>
+<file path=ppt/slides/slide21.xml><?xml version="1.0" encoding="utf-8"?>
 <p:sld xmlns:a="http://schemas.openxmlformats.org/drawingml/2006/main" xmlns:r="http://schemas.openxmlformats.org/officeDocument/2006/relationships" xmlns:p="http://schemas.openxmlformats.org/presentationml/2006/main">
   <p:cSld>
     <p:bg>

</xml_diff>